<commit_message>
Thêm Q&A,sửa 1 lỗi chính tả trong Requirments
</commit_message>
<xml_diff>
--- a/Document/1_Req/Sicco_requirement_20141008.pptx
+++ b/Document/1_Req/Sicco_requirement_20141008.pptx
@@ -268,7 +268,7 @@
             <a:fld id="{9B94B481-3E0A-4242-9A8D-3E3A61947AD1}" type="datetimeFigureOut">
               <a:rPr lang="vi-VN" smtClean="0"/>
               <a:pPr/>
-              <a:t>07/10/2014</a:t>
+              <a:t>09/10/2014</a:t>
             </a:fld>
             <a:endParaRPr lang="vi-VN"/>
           </a:p>
@@ -440,7 +440,7 @@
             <a:fld id="{9B94B481-3E0A-4242-9A8D-3E3A61947AD1}" type="datetimeFigureOut">
               <a:rPr lang="vi-VN" smtClean="0"/>
               <a:pPr/>
-              <a:t>07/10/2014</a:t>
+              <a:t>09/10/2014</a:t>
             </a:fld>
             <a:endParaRPr lang="vi-VN"/>
           </a:p>
@@ -622,7 +622,7 @@
             <a:fld id="{9B94B481-3E0A-4242-9A8D-3E3A61947AD1}" type="datetimeFigureOut">
               <a:rPr lang="vi-VN" smtClean="0"/>
               <a:pPr/>
-              <a:t>07/10/2014</a:t>
+              <a:t>09/10/2014</a:t>
             </a:fld>
             <a:endParaRPr lang="vi-VN"/>
           </a:p>
@@ -794,7 +794,7 @@
             <a:fld id="{9B94B481-3E0A-4242-9A8D-3E3A61947AD1}" type="datetimeFigureOut">
               <a:rPr lang="vi-VN" smtClean="0"/>
               <a:pPr/>
-              <a:t>07/10/2014</a:t>
+              <a:t>09/10/2014</a:t>
             </a:fld>
             <a:endParaRPr lang="vi-VN"/>
           </a:p>
@@ -1042,7 +1042,7 @@
             <a:fld id="{9B94B481-3E0A-4242-9A8D-3E3A61947AD1}" type="datetimeFigureOut">
               <a:rPr lang="vi-VN" smtClean="0"/>
               <a:pPr/>
-              <a:t>07/10/2014</a:t>
+              <a:t>09/10/2014</a:t>
             </a:fld>
             <a:endParaRPr lang="vi-VN"/>
           </a:p>
@@ -1276,7 +1276,7 @@
             <a:fld id="{9B94B481-3E0A-4242-9A8D-3E3A61947AD1}" type="datetimeFigureOut">
               <a:rPr lang="vi-VN" smtClean="0"/>
               <a:pPr/>
-              <a:t>07/10/2014</a:t>
+              <a:t>09/10/2014</a:t>
             </a:fld>
             <a:endParaRPr lang="vi-VN"/>
           </a:p>
@@ -1645,7 +1645,7 @@
             <a:fld id="{9B94B481-3E0A-4242-9A8D-3E3A61947AD1}" type="datetimeFigureOut">
               <a:rPr lang="vi-VN" smtClean="0"/>
               <a:pPr/>
-              <a:t>07/10/2014</a:t>
+              <a:t>09/10/2014</a:t>
             </a:fld>
             <a:endParaRPr lang="vi-VN"/>
           </a:p>
@@ -1765,7 +1765,7 @@
             <a:fld id="{9B94B481-3E0A-4242-9A8D-3E3A61947AD1}" type="datetimeFigureOut">
               <a:rPr lang="vi-VN" smtClean="0"/>
               <a:pPr/>
-              <a:t>07/10/2014</a:t>
+              <a:t>09/10/2014</a:t>
             </a:fld>
             <a:endParaRPr lang="vi-VN"/>
           </a:p>
@@ -1862,7 +1862,7 @@
             <a:fld id="{9B94B481-3E0A-4242-9A8D-3E3A61947AD1}" type="datetimeFigureOut">
               <a:rPr lang="vi-VN" smtClean="0"/>
               <a:pPr/>
-              <a:t>07/10/2014</a:t>
+              <a:t>09/10/2014</a:t>
             </a:fld>
             <a:endParaRPr lang="vi-VN"/>
           </a:p>
@@ -2141,7 +2141,7 @@
             <a:fld id="{9B94B481-3E0A-4242-9A8D-3E3A61947AD1}" type="datetimeFigureOut">
               <a:rPr lang="vi-VN" smtClean="0"/>
               <a:pPr/>
-              <a:t>07/10/2014</a:t>
+              <a:t>09/10/2014</a:t>
             </a:fld>
             <a:endParaRPr lang="vi-VN"/>
           </a:p>
@@ -2396,7 +2396,7 @@
             <a:fld id="{9B94B481-3E0A-4242-9A8D-3E3A61947AD1}" type="datetimeFigureOut">
               <a:rPr lang="vi-VN" smtClean="0"/>
               <a:pPr/>
-              <a:t>07/10/2014</a:t>
+              <a:t>09/10/2014</a:t>
             </a:fld>
             <a:endParaRPr lang="vi-VN"/>
           </a:p>
@@ -2611,7 +2611,7 @@
             <a:fld id="{9B94B481-3E0A-4242-9A8D-3E3A61947AD1}" type="datetimeFigureOut">
               <a:rPr lang="vi-VN" smtClean="0"/>
               <a:pPr/>
-              <a:t>07/10/2014</a:t>
+              <a:t>09/10/2014</a:t>
             </a:fld>
             <a:endParaRPr lang="vi-VN"/>
           </a:p>
@@ -5527,11 +5527,7 @@
             </a:r>
             <a:r>
               <a:rPr lang="en-US" dirty="0" smtClean="0"/>
-              <a:t>: </a:t>
-            </a:r>
-            <a:r>
-              <a:rPr lang="en-US" dirty="0" smtClean="0"/>
-              <a:t>dialog </a:t>
+              <a:t>: dialog </a:t>
             </a:r>
             <a:r>
               <a:rPr lang="en-US" dirty="0" err="1" smtClean="0"/>
@@ -5825,12 +5821,8 @@
               <a:t> </a:t>
             </a:r>
             <a:r>
-              <a:rPr lang="en-US" dirty="0" err="1" smtClean="0"/>
-              <a:t>uploand</a:t>
-            </a:r>
-            <a:r>
-              <a:rPr lang="en-US" dirty="0" smtClean="0"/>
-              <a:t> </a:t>
+              <a:rPr lang="en-US" dirty="0" smtClean="0"/>
+              <a:t>upload </a:t>
             </a:r>
             <a:r>
               <a:rPr lang="en-US" dirty="0" err="1" smtClean="0"/>
@@ -9719,411 +9711,411 @@
           <a:lstStyle/>
           <a:p>
             <a:r>
-              <a:rPr lang="en-US" err="1" smtClean="0"/>
+              <a:rPr lang="en-US" dirty="0" err="1" smtClean="0"/>
               <a:t>Yêu</a:t>
             </a:r>
             <a:r>
-              <a:rPr lang="en-US" smtClean="0"/>
-              <a:t> </a:t>
-            </a:r>
-            <a:r>
-              <a:rPr lang="en-US" err="1" smtClean="0"/>
+              <a:rPr lang="en-US" dirty="0" smtClean="0"/>
+              <a:t> </a:t>
+            </a:r>
+            <a:r>
+              <a:rPr lang="en-US" dirty="0" err="1" smtClean="0"/>
               <a:t>cầu</a:t>
             </a:r>
             <a:r>
-              <a:rPr lang="en-US" smtClean="0"/>
+              <a:rPr lang="en-US" dirty="0" smtClean="0"/>
               <a:t>: </a:t>
             </a:r>
           </a:p>
           <a:p>
             <a:r>
-              <a:rPr lang="en-US" smtClean="0"/>
+              <a:rPr lang="en-US" dirty="0" smtClean="0"/>
               <a:t>+ </a:t>
             </a:r>
             <a:r>
-              <a:rPr lang="en-US" err="1" smtClean="0"/>
+              <a:rPr lang="en-US" dirty="0" err="1" smtClean="0"/>
               <a:t>Các</a:t>
             </a:r>
             <a:r>
-              <a:rPr lang="en-US" smtClean="0"/>
-              <a:t> </a:t>
-            </a:r>
-            <a:r>
-              <a:rPr lang="en-US" err="1" smtClean="0"/>
+              <a:rPr lang="en-US" dirty="0" smtClean="0"/>
+              <a:t> </a:t>
+            </a:r>
+            <a:r>
+              <a:rPr lang="en-US" dirty="0" err="1" smtClean="0"/>
               <a:t>cảnh</a:t>
             </a:r>
             <a:r>
-              <a:rPr lang="en-US" smtClean="0"/>
-              <a:t> </a:t>
-            </a:r>
-            <a:r>
-              <a:rPr lang="en-US" err="1" smtClean="0"/>
+              <a:rPr lang="en-US" dirty="0" smtClean="0"/>
+              <a:t> </a:t>
+            </a:r>
+            <a:r>
+              <a:rPr lang="en-US" dirty="0" err="1" smtClean="0"/>
               <a:t>báo</a:t>
             </a:r>
             <a:r>
-              <a:rPr lang="en-US" smtClean="0"/>
-              <a:t> </a:t>
-            </a:r>
-            <a:r>
-              <a:rPr lang="en-US" err="1" smtClean="0"/>
+              <a:rPr lang="en-US" dirty="0" smtClean="0"/>
+              <a:t> </a:t>
+            </a:r>
+            <a:r>
+              <a:rPr lang="en-US" dirty="0" err="1" smtClean="0"/>
               <a:t>được</a:t>
             </a:r>
             <a:r>
-              <a:rPr lang="en-US" smtClean="0"/>
-              <a:t> </a:t>
-            </a:r>
-            <a:r>
-              <a:rPr lang="en-US" err="1" smtClean="0"/>
+              <a:rPr lang="en-US" dirty="0" smtClean="0"/>
+              <a:t> </a:t>
+            </a:r>
+            <a:r>
+              <a:rPr lang="en-US" dirty="0" err="1" smtClean="0"/>
               <a:t>sắp</a:t>
             </a:r>
             <a:r>
-              <a:rPr lang="en-US" smtClean="0"/>
-              <a:t> </a:t>
-            </a:r>
-            <a:r>
-              <a:rPr lang="en-US" err="1" smtClean="0"/>
+              <a:rPr lang="en-US" dirty="0" smtClean="0"/>
+              <a:t> </a:t>
+            </a:r>
+            <a:r>
+              <a:rPr lang="en-US" dirty="0" err="1" smtClean="0"/>
               <a:t>xếp</a:t>
             </a:r>
             <a:r>
-              <a:rPr lang="en-US" smtClean="0"/>
-              <a:t> </a:t>
-            </a:r>
-            <a:r>
-              <a:rPr lang="en-US" err="1" smtClean="0"/>
+              <a:rPr lang="en-US" dirty="0" smtClean="0"/>
+              <a:t> </a:t>
+            </a:r>
+            <a:r>
+              <a:rPr lang="en-US" dirty="0" err="1" smtClean="0"/>
               <a:t>theo</a:t>
             </a:r>
             <a:r>
-              <a:rPr lang="en-US" smtClean="0"/>
-              <a:t> </a:t>
-            </a:r>
-            <a:r>
-              <a:rPr lang="en-US" err="1" smtClean="0"/>
+              <a:rPr lang="en-US" dirty="0" smtClean="0"/>
+              <a:t> </a:t>
+            </a:r>
+            <a:r>
+              <a:rPr lang="en-US" dirty="0" err="1" smtClean="0"/>
               <a:t>thời</a:t>
             </a:r>
             <a:r>
-              <a:rPr lang="en-US" smtClean="0"/>
-              <a:t> </a:t>
-            </a:r>
-            <a:r>
-              <a:rPr lang="en-US" err="1" smtClean="0"/>
+              <a:rPr lang="en-US" dirty="0" smtClean="0"/>
+              <a:t> </a:t>
+            </a:r>
+            <a:r>
+              <a:rPr lang="en-US" dirty="0" err="1" smtClean="0"/>
               <a:t>gian</a:t>
             </a:r>
             <a:r>
-              <a:rPr lang="en-US" smtClean="0"/>
-              <a:t> </a:t>
-            </a:r>
-            <a:r>
-              <a:rPr lang="en-US" err="1" smtClean="0"/>
+              <a:rPr lang="en-US" dirty="0" smtClean="0"/>
+              <a:t> </a:t>
+            </a:r>
+            <a:r>
+              <a:rPr lang="en-US" dirty="0" err="1" smtClean="0"/>
               <a:t>nhận</a:t>
             </a:r>
             <a:r>
-              <a:rPr lang="en-US" smtClean="0"/>
-              <a:t> </a:t>
-            </a:r>
-            <a:r>
-              <a:rPr lang="en-US" err="1" smtClean="0"/>
+              <a:rPr lang="en-US" dirty="0" smtClean="0"/>
+              <a:t> </a:t>
+            </a:r>
+            <a:r>
+              <a:rPr lang="en-US" dirty="0" err="1" smtClean="0"/>
               <a:t>được</a:t>
             </a:r>
-            <a:endParaRPr lang="en-US" smtClean="0"/>
-          </a:p>
-          <a:p>
-            <a:r>
-              <a:rPr lang="en-US" smtClean="0"/>
+            <a:endParaRPr lang="en-US" dirty="0" smtClean="0"/>
+          </a:p>
+          <a:p>
+            <a:r>
+              <a:rPr lang="en-US" dirty="0" smtClean="0"/>
               <a:t>+ </a:t>
             </a:r>
             <a:r>
-              <a:rPr lang="en-US" err="1" smtClean="0"/>
+              <a:rPr lang="en-US" dirty="0" err="1" smtClean="0"/>
               <a:t>Có</a:t>
             </a:r>
             <a:r>
-              <a:rPr lang="en-US" smtClean="0"/>
-              <a:t> </a:t>
-            </a:r>
-            <a:r>
-              <a:rPr lang="en-US" err="1" smtClean="0"/>
+              <a:rPr lang="en-US" dirty="0" smtClean="0"/>
+              <a:t> </a:t>
+            </a:r>
+            <a:r>
+              <a:rPr lang="en-US" dirty="0" err="1" smtClean="0"/>
               <a:t>đổi</a:t>
             </a:r>
             <a:r>
-              <a:rPr lang="en-US" smtClean="0"/>
-              <a:t> </a:t>
-            </a:r>
-            <a:r>
-              <a:rPr lang="en-US" err="1" smtClean="0"/>
+              <a:rPr lang="en-US" dirty="0" smtClean="0"/>
+              <a:t> </a:t>
+            </a:r>
+            <a:r>
+              <a:rPr lang="en-US" dirty="0" err="1" smtClean="0"/>
               <a:t>màu</a:t>
             </a:r>
             <a:r>
-              <a:rPr lang="en-US" smtClean="0"/>
-              <a:t> </a:t>
-            </a:r>
-            <a:r>
-              <a:rPr lang="en-US" err="1" smtClean="0"/>
+              <a:rPr lang="en-US" dirty="0" smtClean="0"/>
+              <a:t> </a:t>
+            </a:r>
+            <a:r>
+              <a:rPr lang="en-US" dirty="0" err="1" smtClean="0"/>
               <a:t>để</a:t>
             </a:r>
             <a:r>
-              <a:rPr lang="en-US" smtClean="0"/>
-              <a:t> </a:t>
-            </a:r>
-            <a:r>
-              <a:rPr lang="en-US" err="1" smtClean="0"/>
+              <a:rPr lang="en-US" dirty="0" smtClean="0"/>
+              <a:t> </a:t>
+            </a:r>
+            <a:r>
+              <a:rPr lang="en-US" dirty="0" err="1" smtClean="0"/>
               <a:t>biết</a:t>
             </a:r>
             <a:r>
-              <a:rPr lang="en-US" smtClean="0"/>
-              <a:t> </a:t>
-            </a:r>
-            <a:r>
-              <a:rPr lang="en-US" err="1" smtClean="0"/>
+              <a:rPr lang="en-US" dirty="0" smtClean="0"/>
+              <a:t> </a:t>
+            </a:r>
+            <a:r>
+              <a:rPr lang="en-US" dirty="0" err="1" smtClean="0"/>
               <a:t>cảnh</a:t>
             </a:r>
             <a:r>
-              <a:rPr lang="en-US" smtClean="0"/>
-              <a:t> </a:t>
-            </a:r>
-            <a:r>
-              <a:rPr lang="en-US" err="1" smtClean="0"/>
+              <a:rPr lang="en-US" dirty="0" smtClean="0"/>
+              <a:t> </a:t>
+            </a:r>
+            <a:r>
+              <a:rPr lang="en-US" dirty="0" err="1" smtClean="0"/>
               <a:t>báo</a:t>
             </a:r>
             <a:r>
-              <a:rPr lang="en-US" smtClean="0"/>
-              <a:t> </a:t>
-            </a:r>
-            <a:r>
-              <a:rPr lang="en-US" err="1" smtClean="0"/>
+              <a:rPr lang="en-US" dirty="0" smtClean="0"/>
+              <a:t> </a:t>
+            </a:r>
+            <a:r>
+              <a:rPr lang="en-US" dirty="0" err="1" smtClean="0"/>
               <a:t>đã</a:t>
             </a:r>
             <a:r>
-              <a:rPr lang="en-US" smtClean="0"/>
-              <a:t> </a:t>
-            </a:r>
-            <a:r>
-              <a:rPr lang="en-US" err="1" smtClean="0"/>
+              <a:rPr lang="en-US" dirty="0" smtClean="0"/>
+              <a:t> </a:t>
+            </a:r>
+            <a:r>
+              <a:rPr lang="en-US" dirty="0" err="1" smtClean="0"/>
               <a:t>được</a:t>
             </a:r>
             <a:r>
-              <a:rPr lang="en-US" smtClean="0"/>
-              <a:t> </a:t>
-            </a:r>
-            <a:r>
-              <a:rPr lang="en-US" err="1" smtClean="0"/>
+              <a:rPr lang="en-US" dirty="0" smtClean="0"/>
+              <a:t> </a:t>
+            </a:r>
+            <a:r>
+              <a:rPr lang="en-US" dirty="0" err="1" smtClean="0"/>
               <a:t>đọc</a:t>
             </a:r>
             <a:r>
-              <a:rPr lang="en-US" smtClean="0"/>
+              <a:rPr lang="en-US" dirty="0" smtClean="0"/>
               <a:t> hay </a:t>
             </a:r>
             <a:r>
-              <a:rPr lang="en-US" err="1" smtClean="0"/>
+              <a:rPr lang="en-US" dirty="0" err="1" smtClean="0"/>
               <a:t>chưa</a:t>
             </a:r>
-            <a:endParaRPr lang="en-US" smtClean="0"/>
-          </a:p>
-          <a:p>
-            <a:r>
-              <a:rPr lang="en-US" smtClean="0"/>
+            <a:endParaRPr lang="en-US" dirty="0" smtClean="0"/>
+          </a:p>
+          <a:p>
+            <a:r>
+              <a:rPr lang="en-US" dirty="0" smtClean="0"/>
               <a:t>+ </a:t>
             </a:r>
             <a:r>
-              <a:rPr lang="en-US" err="1" smtClean="0"/>
+              <a:rPr lang="en-US" dirty="0" err="1" smtClean="0"/>
               <a:t>Bấm</a:t>
             </a:r>
             <a:r>
-              <a:rPr lang="en-US" smtClean="0"/>
-              <a:t> </a:t>
-            </a:r>
-            <a:r>
-              <a:rPr lang="en-US" err="1" smtClean="0"/>
+              <a:rPr lang="en-US" dirty="0" smtClean="0"/>
+              <a:t> </a:t>
+            </a:r>
+            <a:r>
+              <a:rPr lang="en-US" dirty="0" err="1" smtClean="0"/>
               <a:t>vào</a:t>
             </a:r>
             <a:r>
-              <a:rPr lang="en-US" smtClean="0"/>
+              <a:rPr lang="en-US" dirty="0" smtClean="0"/>
               <a:t> 1 </a:t>
             </a:r>
             <a:r>
-              <a:rPr lang="en-US" err="1" smtClean="0"/>
+              <a:rPr lang="en-US" dirty="0" err="1" smtClean="0"/>
               <a:t>cảnh</a:t>
             </a:r>
             <a:r>
-              <a:rPr lang="en-US" smtClean="0"/>
-              <a:t> </a:t>
-            </a:r>
-            <a:r>
-              <a:rPr lang="en-US" err="1" smtClean="0"/>
+              <a:rPr lang="en-US" dirty="0" smtClean="0"/>
+              <a:t> </a:t>
+            </a:r>
+            <a:r>
+              <a:rPr lang="en-US" dirty="0" err="1" smtClean="0"/>
               <a:t>báo</a:t>
             </a:r>
             <a:r>
-              <a:rPr lang="en-US" smtClean="0"/>
-              <a:t> </a:t>
-            </a:r>
-            <a:r>
-              <a:rPr lang="en-US" err="1" smtClean="0"/>
+              <a:rPr lang="en-US" dirty="0" smtClean="0"/>
+              <a:t> </a:t>
+            </a:r>
+            <a:r>
+              <a:rPr lang="en-US" dirty="0" err="1" smtClean="0"/>
               <a:t>thì</a:t>
             </a:r>
             <a:r>
-              <a:rPr lang="en-US" smtClean="0"/>
-              <a:t> </a:t>
-            </a:r>
-            <a:r>
-              <a:rPr lang="en-US" err="1" smtClean="0"/>
+              <a:rPr lang="en-US" dirty="0" smtClean="0"/>
+              <a:t> </a:t>
+            </a:r>
+            <a:r>
+              <a:rPr lang="en-US" dirty="0" err="1" smtClean="0"/>
               <a:t>mở</a:t>
             </a:r>
             <a:r>
-              <a:rPr lang="en-US" smtClean="0"/>
+              <a:rPr lang="en-US" dirty="0" smtClean="0"/>
               <a:t> link </a:t>
             </a:r>
             <a:r>
-              <a:rPr lang="en-US" err="1" smtClean="0"/>
+              <a:rPr lang="en-US" dirty="0" err="1" smtClean="0"/>
               <a:t>trên</a:t>
             </a:r>
             <a:r>
-              <a:rPr lang="en-US" smtClean="0"/>
-              <a:t> </a:t>
-            </a:r>
-            <a:r>
-              <a:rPr lang="en-US" err="1" smtClean="0"/>
+              <a:rPr lang="en-US" dirty="0" smtClean="0"/>
+              <a:t> </a:t>
+            </a:r>
+            <a:r>
+              <a:rPr lang="en-US" dirty="0" err="1" smtClean="0"/>
               <a:t>trình</a:t>
             </a:r>
             <a:r>
-              <a:rPr lang="en-US" smtClean="0"/>
-              <a:t> </a:t>
-            </a:r>
-            <a:r>
-              <a:rPr lang="en-US" err="1" smtClean="0"/>
+              <a:rPr lang="en-US" dirty="0" smtClean="0"/>
+              <a:t> </a:t>
+            </a:r>
+            <a:r>
+              <a:rPr lang="en-US" dirty="0" err="1" smtClean="0"/>
               <a:t>duyệt</a:t>
             </a:r>
-            <a:endParaRPr lang="en-US" smtClean="0"/>
-          </a:p>
-          <a:p>
-            <a:r>
-              <a:rPr lang="en-US" smtClean="0"/>
+            <a:endParaRPr lang="en-US" dirty="0" smtClean="0"/>
+          </a:p>
+          <a:p>
+            <a:r>
+              <a:rPr lang="en-US" dirty="0" smtClean="0"/>
               <a:t>+ </a:t>
             </a:r>
             <a:r>
-              <a:rPr lang="en-US" err="1" smtClean="0"/>
+              <a:rPr lang="en-US" dirty="0" err="1" smtClean="0"/>
               <a:t>Danh</a:t>
             </a:r>
             <a:r>
-              <a:rPr lang="en-US" smtClean="0"/>
-              <a:t> </a:t>
-            </a:r>
-            <a:r>
-              <a:rPr lang="en-US" err="1" smtClean="0"/>
+              <a:rPr lang="en-US" dirty="0" smtClean="0"/>
+              <a:t> </a:t>
+            </a:r>
+            <a:r>
+              <a:rPr lang="en-US" dirty="0" err="1" smtClean="0"/>
               <a:t>sách</a:t>
             </a:r>
             <a:r>
-              <a:rPr lang="en-US" smtClean="0"/>
-              <a:t> </a:t>
-            </a:r>
-            <a:r>
-              <a:rPr lang="en-US" err="1" smtClean="0"/>
+              <a:rPr lang="en-US" dirty="0" smtClean="0"/>
+              <a:t> </a:t>
+            </a:r>
+            <a:r>
+              <a:rPr lang="en-US" dirty="0" err="1" smtClean="0"/>
               <a:t>cảnh</a:t>
             </a:r>
             <a:r>
-              <a:rPr lang="en-US" smtClean="0"/>
-              <a:t> </a:t>
-            </a:r>
-            <a:r>
-              <a:rPr lang="en-US" err="1" smtClean="0"/>
+              <a:rPr lang="en-US" dirty="0" smtClean="0"/>
+              <a:t> </a:t>
+            </a:r>
+            <a:r>
+              <a:rPr lang="en-US" dirty="0" err="1" smtClean="0"/>
               <a:t>báo</a:t>
             </a:r>
             <a:r>
-              <a:rPr lang="en-US" smtClean="0"/>
-              <a:t> </a:t>
-            </a:r>
-            <a:r>
-              <a:rPr lang="en-US" err="1" smtClean="0"/>
+              <a:rPr lang="en-US" dirty="0" smtClean="0"/>
+              <a:t> </a:t>
+            </a:r>
+            <a:r>
+              <a:rPr lang="en-US" dirty="0" err="1" smtClean="0"/>
               <a:t>được</a:t>
             </a:r>
             <a:r>
-              <a:rPr lang="en-US" smtClean="0"/>
+              <a:rPr lang="en-US" dirty="0" smtClean="0"/>
               <a:t> update real time.</a:t>
             </a:r>
           </a:p>
           <a:p>
             <a:r>
-              <a:rPr lang="en-US" smtClean="0"/>
+              <a:rPr lang="en-US" dirty="0" smtClean="0"/>
               <a:t>- </a:t>
             </a:r>
             <a:r>
-              <a:rPr lang="en-US" err="1" smtClean="0"/>
+              <a:rPr lang="en-US" dirty="0" err="1" smtClean="0"/>
               <a:t>Mỗi</a:t>
             </a:r>
             <a:r>
-              <a:rPr lang="en-US" smtClean="0"/>
-              <a:t> </a:t>
-            </a:r>
-            <a:r>
-              <a:rPr lang="en-US" err="1" smtClean="0"/>
+              <a:rPr lang="en-US" dirty="0" smtClean="0"/>
+              <a:t> </a:t>
+            </a:r>
+            <a:r>
+              <a:rPr lang="en-US" dirty="0" err="1" smtClean="0"/>
               <a:t>lần</a:t>
             </a:r>
             <a:r>
-              <a:rPr lang="en-US" smtClean="0"/>
-              <a:t> </a:t>
-            </a:r>
-            <a:r>
-              <a:rPr lang="en-US" err="1" smtClean="0"/>
+              <a:rPr lang="en-US" dirty="0" smtClean="0"/>
+              <a:t> </a:t>
+            </a:r>
+            <a:r>
+              <a:rPr lang="en-US" dirty="0" err="1" smtClean="0"/>
               <a:t>bấm</a:t>
             </a:r>
             <a:r>
-              <a:rPr lang="en-US" smtClean="0"/>
-              <a:t> </a:t>
-            </a:r>
-            <a:r>
-              <a:rPr lang="en-US" err="1" smtClean="0"/>
+              <a:rPr lang="en-US" dirty="0" smtClean="0"/>
+              <a:t> </a:t>
+            </a:r>
+            <a:r>
+              <a:rPr lang="en-US" dirty="0" err="1" smtClean="0"/>
               <a:t>vào</a:t>
             </a:r>
             <a:r>
-              <a:rPr lang="en-US" smtClean="0"/>
-              <a:t> </a:t>
-            </a:r>
-            <a:r>
-              <a:rPr lang="en-US" err="1" smtClean="0"/>
+              <a:rPr lang="en-US" dirty="0" smtClean="0"/>
+              <a:t> </a:t>
+            </a:r>
+            <a:r>
+              <a:rPr lang="en-US" dirty="0" err="1" smtClean="0"/>
               <a:t>cảnh</a:t>
             </a:r>
             <a:r>
-              <a:rPr lang="en-US" smtClean="0"/>
-              <a:t> </a:t>
-            </a:r>
-            <a:r>
-              <a:rPr lang="en-US" err="1" smtClean="0"/>
+              <a:rPr lang="en-US" dirty="0" smtClean="0"/>
+              <a:t> </a:t>
+            </a:r>
+            <a:r>
+              <a:rPr lang="en-US" dirty="0" err="1" smtClean="0"/>
               <a:t>báo</a:t>
             </a:r>
             <a:r>
-              <a:rPr lang="en-US" smtClean="0"/>
-              <a:t> </a:t>
-            </a:r>
-            <a:r>
-              <a:rPr lang="en-US" err="1" smtClean="0"/>
+              <a:rPr lang="en-US" dirty="0" smtClean="0"/>
+              <a:t> </a:t>
+            </a:r>
+            <a:r>
+              <a:rPr lang="en-US" dirty="0" err="1" smtClean="0"/>
               <a:t>trên</a:t>
             </a:r>
             <a:r>
-              <a:rPr lang="en-US" smtClean="0"/>
+              <a:rPr lang="en-US" dirty="0" smtClean="0"/>
               <a:t> Status Bar </a:t>
             </a:r>
             <a:r>
-              <a:rPr lang="en-US" err="1" smtClean="0"/>
+              <a:rPr lang="en-US" dirty="0" err="1" smtClean="0"/>
               <a:t>thì</a:t>
             </a:r>
             <a:r>
-              <a:rPr lang="en-US" smtClean="0"/>
+              <a:rPr lang="en-US" dirty="0" smtClean="0"/>
               <a:t> reset </a:t>
             </a:r>
             <a:r>
-              <a:rPr lang="en-US" err="1" smtClean="0"/>
+              <a:rPr lang="en-US" dirty="0" err="1" smtClean="0"/>
               <a:t>số</a:t>
             </a:r>
             <a:r>
-              <a:rPr lang="en-US" smtClean="0"/>
-              <a:t> </a:t>
-            </a:r>
-            <a:r>
-              <a:rPr lang="en-US" err="1" smtClean="0"/>
+              <a:rPr lang="en-US" dirty="0" smtClean="0"/>
+              <a:t> </a:t>
+            </a:r>
+            <a:r>
+              <a:rPr lang="en-US" dirty="0" err="1" smtClean="0"/>
               <a:t>đếm</a:t>
             </a:r>
             <a:r>
-              <a:rPr lang="en-US" smtClean="0"/>
+              <a:rPr lang="en-US" dirty="0" smtClean="0"/>
               <a:t>.</a:t>
             </a:r>
-            <a:endParaRPr lang="en-US"/>
+            <a:endParaRPr lang="en-US" dirty="0"/>
           </a:p>
         </p:txBody>
       </p:sp>
@@ -11412,453 +11404,453 @@
           <a:lstStyle/>
           <a:p>
             <a:r>
-              <a:rPr lang="en-US" err="1" smtClean="0"/>
+              <a:rPr lang="en-US" dirty="0" err="1" smtClean="0"/>
               <a:t>Yêu</a:t>
             </a:r>
             <a:r>
-              <a:rPr lang="en-US" smtClean="0"/>
-              <a:t> </a:t>
-            </a:r>
-            <a:r>
-              <a:rPr lang="en-US" err="1" smtClean="0"/>
+              <a:rPr lang="en-US" dirty="0" smtClean="0"/>
+              <a:t> </a:t>
+            </a:r>
+            <a:r>
+              <a:rPr lang="en-US" dirty="0" err="1" smtClean="0"/>
               <a:t>cầu</a:t>
             </a:r>
             <a:r>
-              <a:rPr lang="en-US" smtClean="0"/>
+              <a:rPr lang="en-US" dirty="0" smtClean="0"/>
               <a:t>: </a:t>
             </a:r>
           </a:p>
           <a:p>
             <a:r>
-              <a:rPr lang="en-US" smtClean="0"/>
+              <a:rPr lang="en-US" dirty="0" smtClean="0"/>
               <a:t>+ User </a:t>
             </a:r>
             <a:r>
-              <a:rPr lang="en-US" err="1" smtClean="0"/>
+              <a:rPr lang="en-US" dirty="0" err="1" smtClean="0"/>
               <a:t>chọn</a:t>
             </a:r>
             <a:r>
-              <a:rPr lang="en-US" smtClean="0"/>
-              <a:t> </a:t>
-            </a:r>
-            <a:r>
-              <a:rPr lang="en-US" err="1" smtClean="0"/>
+              <a:rPr lang="en-US" dirty="0" smtClean="0"/>
+              <a:t> </a:t>
+            </a:r>
+            <a:r>
+              <a:rPr lang="en-US" dirty="0" err="1" smtClean="0"/>
               <a:t>vào</a:t>
             </a:r>
             <a:r>
-              <a:rPr lang="en-US" smtClean="0"/>
+              <a:rPr lang="en-US" dirty="0" smtClean="0"/>
               <a:t> ô </a:t>
             </a:r>
             <a:r>
-              <a:rPr lang="en-US" err="1" smtClean="0"/>
+              <a:rPr lang="en-US" dirty="0" err="1" smtClean="0"/>
               <a:t>Tất</a:t>
             </a:r>
             <a:r>
-              <a:rPr lang="en-US" smtClean="0"/>
-              <a:t> </a:t>
-            </a:r>
-            <a:r>
-              <a:rPr lang="en-US" err="1" smtClean="0"/>
+              <a:rPr lang="en-US" dirty="0" smtClean="0"/>
+              <a:t> </a:t>
+            </a:r>
+            <a:r>
+              <a:rPr lang="en-US" dirty="0" err="1" smtClean="0"/>
               <a:t>cả</a:t>
             </a:r>
             <a:r>
-              <a:rPr lang="en-US" smtClean="0"/>
+              <a:rPr lang="en-US" dirty="0" smtClean="0"/>
               <a:t> =&gt; </a:t>
             </a:r>
             <a:r>
-              <a:rPr lang="en-US" err="1" smtClean="0"/>
+              <a:rPr lang="en-US" dirty="0" err="1" smtClean="0"/>
               <a:t>chọn</a:t>
             </a:r>
             <a:r>
-              <a:rPr lang="en-US" smtClean="0"/>
+              <a:rPr lang="en-US" dirty="0" smtClean="0"/>
               <a:t> 1 </a:t>
             </a:r>
             <a:r>
-              <a:rPr lang="en-US" err="1" smtClean="0"/>
+              <a:rPr lang="en-US" dirty="0" err="1" smtClean="0"/>
               <a:t>tiêu</a:t>
             </a:r>
             <a:r>
-              <a:rPr lang="en-US" smtClean="0"/>
-              <a:t> </a:t>
-            </a:r>
-            <a:r>
-              <a:rPr lang="en-US" err="1" smtClean="0"/>
+              <a:rPr lang="en-US" dirty="0" smtClean="0"/>
+              <a:t> </a:t>
+            </a:r>
+            <a:r>
+              <a:rPr lang="en-US" dirty="0" err="1" smtClean="0"/>
               <a:t>chí</a:t>
             </a:r>
             <a:r>
-              <a:rPr lang="en-US" smtClean="0"/>
-              <a:t> </a:t>
-            </a:r>
-            <a:r>
-              <a:rPr lang="en-US" err="1" smtClean="0"/>
+              <a:rPr lang="en-US" dirty="0" smtClean="0"/>
+              <a:t> </a:t>
+            </a:r>
+            <a:r>
+              <a:rPr lang="en-US" dirty="0" err="1" smtClean="0"/>
               <a:t>để</a:t>
             </a:r>
             <a:r>
-              <a:rPr lang="en-US" smtClean="0"/>
-              <a:t> </a:t>
-            </a:r>
-            <a:r>
-              <a:rPr lang="en-US" err="1" smtClean="0"/>
+              <a:rPr lang="en-US" dirty="0" smtClean="0"/>
+              <a:t> </a:t>
+            </a:r>
+            <a:r>
+              <a:rPr lang="en-US" dirty="0" err="1" smtClean="0"/>
               <a:t>tìm</a:t>
             </a:r>
             <a:r>
-              <a:rPr lang="en-US" smtClean="0"/>
-              <a:t> </a:t>
-            </a:r>
-            <a:r>
-              <a:rPr lang="en-US" err="1" smtClean="0"/>
+              <a:rPr lang="en-US" dirty="0" smtClean="0"/>
+              <a:t> </a:t>
+            </a:r>
+            <a:r>
+              <a:rPr lang="en-US" dirty="0" err="1" smtClean="0"/>
               <a:t>kiếm</a:t>
             </a:r>
-            <a:endParaRPr lang="en-US" smtClean="0"/>
-          </a:p>
-          <a:p>
-            <a:r>
-              <a:rPr lang="en-US" smtClean="0"/>
+            <a:endParaRPr lang="en-US" dirty="0" smtClean="0"/>
+          </a:p>
+          <a:p>
+            <a:r>
+              <a:rPr lang="en-US" dirty="0" smtClean="0"/>
               <a:t>+ </a:t>
             </a:r>
             <a:r>
-              <a:rPr lang="en-US" err="1" smtClean="0"/>
+              <a:rPr lang="en-US" dirty="0" err="1" smtClean="0"/>
               <a:t>Các</a:t>
             </a:r>
             <a:r>
-              <a:rPr lang="en-US" smtClean="0"/>
-              <a:t> </a:t>
-            </a:r>
-            <a:r>
-              <a:rPr lang="en-US" err="1" smtClean="0"/>
+              <a:rPr lang="en-US" dirty="0" smtClean="0"/>
+              <a:t> </a:t>
+            </a:r>
+            <a:r>
+              <a:rPr lang="en-US" dirty="0" err="1" smtClean="0"/>
               <a:t>tiêu</a:t>
             </a:r>
             <a:r>
-              <a:rPr lang="en-US" smtClean="0"/>
-              <a:t> </a:t>
-            </a:r>
-            <a:r>
-              <a:rPr lang="en-US" err="1" smtClean="0"/>
+              <a:rPr lang="en-US" dirty="0" smtClean="0"/>
+              <a:t> </a:t>
+            </a:r>
+            <a:r>
+              <a:rPr lang="en-US" dirty="0" err="1" smtClean="0"/>
               <a:t>chí</a:t>
             </a:r>
             <a:r>
-              <a:rPr lang="en-US" smtClean="0"/>
-              <a:t> </a:t>
-            </a:r>
-            <a:r>
-              <a:rPr lang="en-US" err="1" smtClean="0"/>
+              <a:rPr lang="en-US" dirty="0" smtClean="0"/>
+              <a:t> </a:t>
+            </a:r>
+            <a:r>
+              <a:rPr lang="en-US" dirty="0" err="1" smtClean="0"/>
               <a:t>có</a:t>
             </a:r>
             <a:r>
-              <a:rPr lang="en-US" smtClean="0"/>
-              <a:t> </a:t>
-            </a:r>
-            <a:r>
-              <a:rPr lang="en-US" err="1" smtClean="0"/>
+              <a:rPr lang="en-US" dirty="0" smtClean="0"/>
+              <a:t> </a:t>
+            </a:r>
+            <a:r>
+              <a:rPr lang="en-US" dirty="0" err="1" smtClean="0"/>
               <a:t>thể</a:t>
             </a:r>
             <a:r>
-              <a:rPr lang="en-US" smtClean="0"/>
-              <a:t> </a:t>
-            </a:r>
-            <a:r>
-              <a:rPr lang="en-US" err="1" smtClean="0"/>
+              <a:rPr lang="en-US" dirty="0" smtClean="0"/>
+              <a:t> </a:t>
+            </a:r>
+            <a:r>
+              <a:rPr lang="en-US" dirty="0" err="1" smtClean="0"/>
               <a:t>lựa</a:t>
             </a:r>
             <a:r>
-              <a:rPr lang="en-US" smtClean="0"/>
-              <a:t> </a:t>
-            </a:r>
-            <a:r>
-              <a:rPr lang="en-US" err="1" smtClean="0"/>
+              <a:rPr lang="en-US" dirty="0" smtClean="0"/>
+              <a:t> </a:t>
+            </a:r>
+            <a:r>
+              <a:rPr lang="en-US" dirty="0" err="1" smtClean="0"/>
               <a:t>chọn</a:t>
             </a:r>
             <a:r>
-              <a:rPr lang="en-US" smtClean="0"/>
-              <a:t> </a:t>
-            </a:r>
-            <a:r>
-              <a:rPr lang="en-US" err="1" smtClean="0"/>
+              <a:rPr lang="en-US" dirty="0" smtClean="0"/>
+              <a:t> </a:t>
+            </a:r>
+            <a:r>
+              <a:rPr lang="en-US" dirty="0" err="1" smtClean="0"/>
               <a:t>để</a:t>
             </a:r>
             <a:r>
-              <a:rPr lang="en-US" smtClean="0"/>
-              <a:t> </a:t>
-            </a:r>
-            <a:r>
-              <a:rPr lang="en-US" err="1" smtClean="0"/>
+              <a:rPr lang="en-US" dirty="0" smtClean="0"/>
+              <a:t> </a:t>
+            </a:r>
+            <a:r>
+              <a:rPr lang="en-US" dirty="0" err="1" smtClean="0"/>
               <a:t>tìm</a:t>
             </a:r>
             <a:r>
-              <a:rPr lang="en-US" smtClean="0"/>
-              <a:t> </a:t>
-            </a:r>
-            <a:r>
-              <a:rPr lang="en-US" err="1" smtClean="0"/>
+              <a:rPr lang="en-US" dirty="0" smtClean="0"/>
+              <a:t> </a:t>
+            </a:r>
+            <a:r>
+              <a:rPr lang="en-US" dirty="0" err="1" smtClean="0"/>
               <a:t>kiếm</a:t>
             </a:r>
             <a:r>
-              <a:rPr lang="en-US" smtClean="0"/>
+              <a:rPr lang="en-US" dirty="0" smtClean="0"/>
               <a:t>: </a:t>
             </a:r>
             <a:r>
-              <a:rPr lang="en-US" err="1" smtClean="0"/>
+              <a:rPr lang="en-US" dirty="0" err="1" smtClean="0"/>
               <a:t>Tên</a:t>
             </a:r>
             <a:r>
-              <a:rPr lang="en-US" smtClean="0"/>
-              <a:t> </a:t>
-            </a:r>
-            <a:r>
-              <a:rPr lang="en-US" err="1" smtClean="0"/>
+              <a:rPr lang="en-US" dirty="0" smtClean="0"/>
+              <a:t> </a:t>
+            </a:r>
+            <a:r>
+              <a:rPr lang="en-US" dirty="0" err="1" smtClean="0"/>
               <a:t>công</a:t>
             </a:r>
             <a:r>
-              <a:rPr lang="en-US" smtClean="0"/>
-              <a:t> </a:t>
-            </a:r>
-            <a:r>
-              <a:rPr lang="en-US" err="1" smtClean="0"/>
+              <a:rPr lang="en-US" dirty="0" smtClean="0"/>
+              <a:t> </a:t>
+            </a:r>
+            <a:r>
+              <a:rPr lang="en-US" dirty="0" err="1" smtClean="0"/>
               <a:t>việc</a:t>
             </a:r>
             <a:r>
-              <a:rPr lang="en-US" smtClean="0"/>
+              <a:rPr lang="en-US" dirty="0" smtClean="0"/>
               <a:t>, </a:t>
             </a:r>
             <a:r>
-              <a:rPr lang="en-US" err="1" smtClean="0"/>
+              <a:rPr lang="en-US" dirty="0" err="1" smtClean="0"/>
               <a:t>Người</a:t>
             </a:r>
             <a:r>
-              <a:rPr lang="en-US" smtClean="0"/>
-              <a:t> </a:t>
-            </a:r>
-            <a:r>
-              <a:rPr lang="en-US" err="1" smtClean="0"/>
+              <a:rPr lang="en-US" dirty="0" smtClean="0"/>
+              <a:t> </a:t>
+            </a:r>
+            <a:r>
+              <a:rPr lang="en-US" dirty="0" err="1" smtClean="0"/>
               <a:t>giao</a:t>
             </a:r>
             <a:r>
-              <a:rPr lang="en-US" smtClean="0"/>
+              <a:rPr lang="en-US" dirty="0" smtClean="0"/>
               <a:t>, </a:t>
             </a:r>
             <a:r>
-              <a:rPr lang="en-US" err="1" smtClean="0"/>
+              <a:rPr lang="en-US" dirty="0" err="1" smtClean="0"/>
               <a:t>Người</a:t>
             </a:r>
             <a:r>
-              <a:rPr lang="en-US" smtClean="0"/>
-              <a:t> </a:t>
-            </a:r>
-            <a:r>
-              <a:rPr lang="en-US" err="1" smtClean="0"/>
+              <a:rPr lang="en-US" dirty="0" smtClean="0"/>
+              <a:t> </a:t>
+            </a:r>
+            <a:r>
+              <a:rPr lang="en-US" dirty="0" err="1" smtClean="0"/>
               <a:t>được</a:t>
             </a:r>
             <a:r>
-              <a:rPr lang="en-US" smtClean="0"/>
-              <a:t> </a:t>
-            </a:r>
-            <a:r>
-              <a:rPr lang="en-US" err="1" smtClean="0"/>
+              <a:rPr lang="en-US" dirty="0" smtClean="0"/>
+              <a:t> </a:t>
+            </a:r>
+            <a:r>
+              <a:rPr lang="en-US" dirty="0" err="1" smtClean="0"/>
               <a:t>giao</a:t>
             </a:r>
             <a:r>
-              <a:rPr lang="en-US" smtClean="0"/>
+              <a:rPr lang="en-US" dirty="0" smtClean="0"/>
               <a:t>.</a:t>
             </a:r>
           </a:p>
           <a:p>
             <a:r>
-              <a:rPr lang="en-US" smtClean="0"/>
+              <a:rPr lang="en-US" dirty="0" smtClean="0"/>
               <a:t>+ </a:t>
             </a:r>
             <a:r>
-              <a:rPr lang="en-US" err="1" smtClean="0"/>
+              <a:rPr lang="en-US" dirty="0" err="1" smtClean="0"/>
               <a:t>Danh</a:t>
             </a:r>
             <a:r>
-              <a:rPr lang="en-US" smtClean="0"/>
-              <a:t> </a:t>
-            </a:r>
-            <a:r>
-              <a:rPr lang="en-US" err="1" smtClean="0"/>
+              <a:rPr lang="en-US" dirty="0" smtClean="0"/>
+              <a:t> </a:t>
+            </a:r>
+            <a:r>
+              <a:rPr lang="en-US" dirty="0" err="1" smtClean="0"/>
               <a:t>sách</a:t>
             </a:r>
             <a:r>
-              <a:rPr lang="en-US" smtClean="0"/>
-              <a:t> </a:t>
-            </a:r>
-            <a:r>
-              <a:rPr lang="en-US" err="1" smtClean="0"/>
+              <a:rPr lang="en-US" dirty="0" smtClean="0"/>
+              <a:t> </a:t>
+            </a:r>
+            <a:r>
+              <a:rPr lang="en-US" dirty="0" err="1" smtClean="0"/>
               <a:t>các</a:t>
             </a:r>
             <a:r>
-              <a:rPr lang="en-US" smtClean="0"/>
-              <a:t> </a:t>
-            </a:r>
-            <a:r>
-              <a:rPr lang="en-US" err="1" smtClean="0"/>
+              <a:rPr lang="en-US" dirty="0" smtClean="0"/>
+              <a:t> </a:t>
+            </a:r>
+            <a:r>
+              <a:rPr lang="en-US" dirty="0" err="1" smtClean="0"/>
               <a:t>công</a:t>
             </a:r>
             <a:r>
-              <a:rPr lang="en-US" smtClean="0"/>
-              <a:t> </a:t>
-            </a:r>
-            <a:r>
-              <a:rPr lang="en-US" err="1" smtClean="0"/>
+              <a:rPr lang="en-US" dirty="0" smtClean="0"/>
+              <a:t> </a:t>
+            </a:r>
+            <a:r>
+              <a:rPr lang="en-US" dirty="0" err="1" smtClean="0"/>
               <a:t>việc</a:t>
             </a:r>
             <a:r>
-              <a:rPr lang="en-US" smtClean="0"/>
-              <a:t> </a:t>
-            </a:r>
-            <a:r>
-              <a:rPr lang="en-US" err="1" smtClean="0"/>
+              <a:rPr lang="en-US" dirty="0" smtClean="0"/>
+              <a:t> </a:t>
+            </a:r>
+            <a:r>
+              <a:rPr lang="en-US" dirty="0" err="1" smtClean="0"/>
               <a:t>tìm</a:t>
             </a:r>
             <a:r>
-              <a:rPr lang="en-US" smtClean="0"/>
-              <a:t> </a:t>
-            </a:r>
-            <a:r>
-              <a:rPr lang="en-US" err="1" smtClean="0"/>
+              <a:rPr lang="en-US" dirty="0" smtClean="0"/>
+              <a:t> </a:t>
+            </a:r>
+            <a:r>
+              <a:rPr lang="en-US" dirty="0" err="1" smtClean="0"/>
               <a:t>thấy</a:t>
             </a:r>
             <a:r>
-              <a:rPr lang="en-US" smtClean="0"/>
-              <a:t> </a:t>
-            </a:r>
-            <a:r>
-              <a:rPr lang="en-US" err="1" smtClean="0"/>
+              <a:rPr lang="en-US" dirty="0" smtClean="0"/>
+              <a:t> </a:t>
+            </a:r>
+            <a:r>
+              <a:rPr lang="en-US" dirty="0" err="1" smtClean="0"/>
               <a:t>được</a:t>
             </a:r>
             <a:r>
-              <a:rPr lang="en-US" smtClean="0"/>
-              <a:t> </a:t>
-            </a:r>
-            <a:r>
-              <a:rPr lang="en-US" err="1" smtClean="0"/>
+              <a:rPr lang="en-US" dirty="0" smtClean="0"/>
+              <a:t> </a:t>
+            </a:r>
+            <a:r>
+              <a:rPr lang="en-US" dirty="0" err="1" smtClean="0"/>
               <a:t>hiển</a:t>
             </a:r>
             <a:r>
-              <a:rPr lang="en-US" smtClean="0"/>
-              <a:t> </a:t>
-            </a:r>
-            <a:r>
-              <a:rPr lang="en-US" err="1" smtClean="0"/>
+              <a:rPr lang="en-US" dirty="0" smtClean="0"/>
+              <a:t> </a:t>
+            </a:r>
+            <a:r>
+              <a:rPr lang="en-US" dirty="0" err="1" smtClean="0"/>
               <a:t>thị</a:t>
             </a:r>
             <a:r>
-              <a:rPr lang="en-US" smtClean="0"/>
-              <a:t> </a:t>
-            </a:r>
-            <a:r>
-              <a:rPr lang="en-US" err="1" smtClean="0"/>
+              <a:rPr lang="en-US" dirty="0" smtClean="0"/>
+              <a:t> </a:t>
+            </a:r>
+            <a:r>
+              <a:rPr lang="en-US" dirty="0" err="1" smtClean="0"/>
               <a:t>trong</a:t>
             </a:r>
             <a:r>
-              <a:rPr lang="en-US" smtClean="0"/>
+              <a:rPr lang="en-US" dirty="0" smtClean="0"/>
               <a:t> layout </a:t>
             </a:r>
             <a:r>
-              <a:rPr lang="en-US" err="1" smtClean="0"/>
+              <a:rPr lang="en-US" dirty="0" err="1" smtClean="0"/>
               <a:t>như</a:t>
             </a:r>
             <a:r>
-              <a:rPr lang="en-US" smtClean="0"/>
-              <a:t> </a:t>
-            </a:r>
-            <a:r>
-              <a:rPr lang="en-US" err="1" smtClean="0"/>
+              <a:rPr lang="en-US" dirty="0" smtClean="0"/>
+              <a:t> </a:t>
+            </a:r>
+            <a:r>
+              <a:rPr lang="en-US" dirty="0" err="1" smtClean="0"/>
               <a:t>hình</a:t>
             </a:r>
             <a:r>
-              <a:rPr lang="en-US" smtClean="0"/>
-              <a:t> </a:t>
-            </a:r>
-            <a:r>
-              <a:rPr lang="en-US" err="1" smtClean="0"/>
+              <a:rPr lang="en-US" dirty="0" smtClean="0"/>
+              <a:t> </a:t>
+            </a:r>
+            <a:r>
+              <a:rPr lang="en-US" dirty="0" err="1" smtClean="0"/>
               <a:t>vẽ</a:t>
             </a:r>
             <a:r>
-              <a:rPr lang="en-US" smtClean="0"/>
+              <a:rPr lang="en-US" dirty="0" smtClean="0"/>
               <a:t>: </a:t>
             </a:r>
             <a:r>
-              <a:rPr lang="en-US" err="1" smtClean="0"/>
+              <a:rPr lang="en-US" dirty="0" err="1" smtClean="0"/>
               <a:t>gồm</a:t>
             </a:r>
             <a:r>
-              <a:rPr lang="en-US" smtClean="0"/>
-              <a:t> </a:t>
-            </a:r>
-            <a:r>
-              <a:rPr lang="en-US" err="1" smtClean="0"/>
+              <a:rPr lang="en-US" dirty="0" smtClean="0"/>
+              <a:t> </a:t>
+            </a:r>
+            <a:r>
+              <a:rPr lang="en-US" dirty="0" err="1" smtClean="0"/>
               <a:t>Tên</a:t>
             </a:r>
             <a:r>
-              <a:rPr lang="en-US" smtClean="0"/>
-              <a:t> </a:t>
-            </a:r>
-            <a:r>
-              <a:rPr lang="en-US" err="1" smtClean="0"/>
+              <a:rPr lang="en-US" dirty="0" smtClean="0"/>
+              <a:t> </a:t>
+            </a:r>
+            <a:r>
+              <a:rPr lang="en-US" dirty="0" err="1" smtClean="0"/>
               <a:t>công</a:t>
             </a:r>
             <a:r>
-              <a:rPr lang="en-US" smtClean="0"/>
-              <a:t> </a:t>
-            </a:r>
-            <a:r>
-              <a:rPr lang="en-US" err="1" smtClean="0"/>
+              <a:rPr lang="en-US" dirty="0" smtClean="0"/>
+              <a:t> </a:t>
+            </a:r>
+            <a:r>
+              <a:rPr lang="en-US" dirty="0" err="1" smtClean="0"/>
               <a:t>việc</a:t>
             </a:r>
             <a:r>
-              <a:rPr lang="en-US" smtClean="0"/>
-              <a:t> </a:t>
-            </a:r>
-            <a:r>
-              <a:rPr lang="en-US" err="1" smtClean="0"/>
+              <a:rPr lang="en-US" dirty="0" smtClean="0"/>
+              <a:t> </a:t>
+            </a:r>
+            <a:r>
+              <a:rPr lang="en-US" dirty="0" err="1" smtClean="0"/>
               <a:t>và</a:t>
             </a:r>
             <a:r>
-              <a:rPr lang="en-US" smtClean="0"/>
-              <a:t> </a:t>
-            </a:r>
-            <a:r>
-              <a:rPr lang="en-US" err="1" smtClean="0"/>
+              <a:rPr lang="en-US" dirty="0" smtClean="0"/>
+              <a:t> </a:t>
+            </a:r>
+            <a:r>
+              <a:rPr lang="en-US" dirty="0" err="1" smtClean="0"/>
               <a:t>Hạn</a:t>
             </a:r>
             <a:r>
-              <a:rPr lang="en-US" smtClean="0"/>
-              <a:t> </a:t>
-            </a:r>
-            <a:r>
-              <a:rPr lang="en-US" err="1" smtClean="0"/>
+              <a:rPr lang="en-US" dirty="0" smtClean="0"/>
+              <a:t> </a:t>
+            </a:r>
+            <a:r>
+              <a:rPr lang="en-US" dirty="0" err="1" smtClean="0"/>
               <a:t>cuối</a:t>
             </a:r>
             <a:r>
-              <a:rPr lang="en-US" smtClean="0"/>
-              <a:t> </a:t>
-            </a:r>
-            <a:r>
-              <a:rPr lang="en-US" err="1" smtClean="0"/>
+              <a:rPr lang="en-US" dirty="0" smtClean="0"/>
+              <a:t> </a:t>
+            </a:r>
+            <a:r>
+              <a:rPr lang="en-US" dirty="0" err="1" smtClean="0"/>
               <a:t>của</a:t>
             </a:r>
             <a:r>
-              <a:rPr lang="en-US" smtClean="0"/>
-              <a:t> </a:t>
-            </a:r>
-            <a:r>
-              <a:rPr lang="en-US" err="1" smtClean="0"/>
+              <a:rPr lang="en-US" dirty="0" smtClean="0"/>
+              <a:t> </a:t>
+            </a:r>
+            <a:r>
+              <a:rPr lang="en-US" dirty="0" err="1" smtClean="0"/>
               <a:t>công</a:t>
             </a:r>
             <a:r>
-              <a:rPr lang="en-US" smtClean="0"/>
-              <a:t> </a:t>
-            </a:r>
-            <a:r>
-              <a:rPr lang="en-US" err="1" smtClean="0"/>
+              <a:rPr lang="en-US" dirty="0" smtClean="0"/>
+              <a:t> </a:t>
+            </a:r>
+            <a:r>
+              <a:rPr lang="en-US" dirty="0" err="1" smtClean="0"/>
               <a:t>việc</a:t>
             </a:r>
             <a:r>
-              <a:rPr lang="en-US" smtClean="0"/>
+              <a:rPr lang="en-US" dirty="0" smtClean="0"/>
               <a:t>.</a:t>
             </a:r>
-            <a:endParaRPr lang="en-US"/>
+            <a:endParaRPr lang="en-US" dirty="0"/>
           </a:p>
         </p:txBody>
       </p:sp>

</xml_diff>